<commit_message>
changes made in the presentations
</commit_message>
<xml_diff>
--- a/Final Project.pptx
+++ b/Final Project.pptx
@@ -7968,7 +7968,7 @@
           <a:lstStyle/>
           <a:p>
             <a:r>
-              <a:rPr lang="en-US"/>
+              <a:rPr lang="en-US" dirty="0"/>
               <a:t>Final Project Link</a:t>
             </a:r>
           </a:p>
@@ -7995,7 +7995,47 @@
           <a:bodyPr/>
           <a:lstStyle/>
           <a:p>
-            <a:endParaRPr lang="en-US"/>
+            <a:r>
+              <a:rPr lang="en-US" dirty="0">
+                <a:hlinkClick r:id="rId2"/>
+              </a:rPr>
+              <a:t>https://github.com/siddbose97/pythonWorkshop/blob/master/rps.py</a:t>
+            </a:r>
+            <a:endParaRPr lang="en-US" dirty="0"/>
+          </a:p>
+          <a:p>
+            <a:pPr marL="0" indent="0">
+              <a:buNone/>
+            </a:pPr>
+            <a:endParaRPr lang="en-US" dirty="0"/>
+          </a:p>
+          <a:p>
+            <a:pPr marL="0" indent="0">
+              <a:buNone/>
+            </a:pPr>
+            <a:r>
+              <a:rPr lang="en-US" dirty="0"/>
+              <a:t>At this link you can find the final code for this project</a:t>
+            </a:r>
+          </a:p>
+          <a:p>
+            <a:pPr marL="0" indent="0">
+              <a:buNone/>
+            </a:pPr>
+            <a:endParaRPr lang="en-US" dirty="0"/>
+          </a:p>
+          <a:p>
+            <a:pPr marL="0" indent="0">
+              <a:buNone/>
+            </a:pPr>
+            <a:r>
+              <a:rPr lang="en-US" dirty="0"/>
+              <a:t>As I mentioned earlier, if you wish to contact me for help or any questions please reach out </a:t>
+            </a:r>
+            <a:r>
+              <a:rPr lang="en-US"/>
+              <a:t>at siddbose97@gmail.com</a:t>
+            </a:r>
           </a:p>
         </p:txBody>
       </p:sp>

</xml_diff>

<commit_message>
fixed error where bad input counter was not instantiated early enough
</commit_message>
<xml_diff>
--- a/Final Project.pptx
+++ b/Final Project.pptx
@@ -8030,11 +8030,7 @@
             </a:pPr>
             <a:r>
               <a:rPr lang="en-US" dirty="0"/>
-              <a:t>As I mentioned earlier, if you wish to contact me for help or any questions please reach out </a:t>
-            </a:r>
-            <a:r>
-              <a:rPr lang="en-US"/>
-              <a:t>at siddbose97@gmail.com</a:t>
+              <a:t>As I mentioned earlier, if you wish to contact me for help or any questions please reach out at siddbose97@gmail.com</a:t>
             </a:r>
           </a:p>
         </p:txBody>

</xml_diff>